<commit_message>
Añadimos todos los procesos
</commit_message>
<xml_diff>
--- a/Presentacion curso Spring.pptx
+++ b/Presentacion curso Spring.pptx
@@ -199,7 +199,7 @@
           <a:p>
             <a:fld id="{C5E4E8B3-BC3D-4B17-AD72-6EEF0757A344}" type="datetimeFigureOut">
               <a:rPr lang="es-ES" smtClean="0"/>
-              <a:t>27/12/2023</a:t>
+              <a:t>08/01/2024</a:t>
             </a:fld>
             <a:endParaRPr lang="es-ES"/>
           </a:p>
@@ -871,7 +871,7 @@
           <a:p>
             <a:fld id="{CD7214D7-428D-4601-A337-8B3EF9271EE1}" type="datetimeFigureOut">
               <a:rPr lang="es-ES" smtClean="0"/>
-              <a:t>27/12/2023</a:t>
+              <a:t>08/01/2024</a:t>
             </a:fld>
             <a:endParaRPr lang="es-ES"/>
           </a:p>
@@ -1162,7 +1162,7 @@
           <a:p>
             <a:fld id="{CD7214D7-428D-4601-A337-8B3EF9271EE1}" type="datetimeFigureOut">
               <a:rPr lang="es-ES" smtClean="0"/>
-              <a:t>27/12/2023</a:t>
+              <a:t>08/01/2024</a:t>
             </a:fld>
             <a:endParaRPr lang="es-ES"/>
           </a:p>
@@ -1421,7 +1421,7 @@
           <a:p>
             <a:fld id="{CD7214D7-428D-4601-A337-8B3EF9271EE1}" type="datetimeFigureOut">
               <a:rPr lang="es-ES" smtClean="0"/>
-              <a:t>27/12/2023</a:t>
+              <a:t>08/01/2024</a:t>
             </a:fld>
             <a:endParaRPr lang="es-ES"/>
           </a:p>
@@ -1890,7 +1890,7 @@
           <a:p>
             <a:fld id="{CD7214D7-428D-4601-A337-8B3EF9271EE1}" type="datetimeFigureOut">
               <a:rPr lang="es-ES" smtClean="0"/>
-              <a:t>27/12/2023</a:t>
+              <a:t>08/01/2024</a:t>
             </a:fld>
             <a:endParaRPr lang="es-ES"/>
           </a:p>
@@ -2070,7 +2070,7 @@
           <a:p>
             <a:fld id="{CD7214D7-428D-4601-A337-8B3EF9271EE1}" type="datetimeFigureOut">
               <a:rPr lang="es-ES" smtClean="0"/>
-              <a:t>27/12/2023</a:t>
+              <a:t>08/01/2024</a:t>
             </a:fld>
             <a:endParaRPr lang="es-ES"/>
           </a:p>
@@ -2646,7 +2646,7 @@
           <a:p>
             <a:fld id="{CD7214D7-428D-4601-A337-8B3EF9271EE1}" type="datetimeFigureOut">
               <a:rPr lang="es-ES" smtClean="0"/>
-              <a:t>27/12/2023</a:t>
+              <a:t>08/01/2024</a:t>
             </a:fld>
             <a:endParaRPr lang="es-ES"/>
           </a:p>
@@ -2978,7 +2978,7 @@
           <a:p>
             <a:fld id="{CD7214D7-428D-4601-A337-8B3EF9271EE1}" type="datetimeFigureOut">
               <a:rPr lang="es-ES" smtClean="0"/>
-              <a:t>27/12/2023</a:t>
+              <a:t>08/01/2024</a:t>
             </a:fld>
             <a:endParaRPr lang="es-ES"/>
           </a:p>
@@ -3153,7 +3153,7 @@
           <a:p>
             <a:fld id="{CD7214D7-428D-4601-A337-8B3EF9271EE1}" type="datetimeFigureOut">
               <a:rPr lang="es-ES" smtClean="0"/>
-              <a:t>27/12/2023</a:t>
+              <a:t>08/01/2024</a:t>
             </a:fld>
             <a:endParaRPr lang="es-ES"/>
           </a:p>
@@ -3333,7 +3333,7 @@
           <a:p>
             <a:fld id="{CD7214D7-428D-4601-A337-8B3EF9271EE1}" type="datetimeFigureOut">
               <a:rPr lang="es-ES" smtClean="0"/>
-              <a:t>27/12/2023</a:t>
+              <a:t>08/01/2024</a:t>
             </a:fld>
             <a:endParaRPr lang="es-ES"/>
           </a:p>
@@ -3503,7 +3503,7 @@
           <a:p>
             <a:fld id="{CD7214D7-428D-4601-A337-8B3EF9271EE1}" type="datetimeFigureOut">
               <a:rPr lang="es-ES" smtClean="0"/>
-              <a:t>27/12/2023</a:t>
+              <a:t>08/01/2024</a:t>
             </a:fld>
             <a:endParaRPr lang="es-ES"/>
           </a:p>
@@ -3760,7 +3760,7 @@
           <a:p>
             <a:fld id="{CD7214D7-428D-4601-A337-8B3EF9271EE1}" type="datetimeFigureOut">
               <a:rPr lang="es-ES" smtClean="0"/>
-              <a:t>27/12/2023</a:t>
+              <a:t>08/01/2024</a:t>
             </a:fld>
             <a:endParaRPr lang="es-ES"/>
           </a:p>
@@ -4052,7 +4052,7 @@
           <a:p>
             <a:fld id="{CD7214D7-428D-4601-A337-8B3EF9271EE1}" type="datetimeFigureOut">
               <a:rPr lang="es-ES" smtClean="0"/>
-              <a:t>27/12/2023</a:t>
+              <a:t>08/01/2024</a:t>
             </a:fld>
             <a:endParaRPr lang="es-ES"/>
           </a:p>
@@ -4482,7 +4482,7 @@
           <a:p>
             <a:fld id="{CD7214D7-428D-4601-A337-8B3EF9271EE1}" type="datetimeFigureOut">
               <a:rPr lang="es-ES" smtClean="0"/>
-              <a:t>27/12/2023</a:t>
+              <a:t>08/01/2024</a:t>
             </a:fld>
             <a:endParaRPr lang="es-ES"/>
           </a:p>
@@ -4600,7 +4600,7 @@
           <a:p>
             <a:fld id="{CD7214D7-428D-4601-A337-8B3EF9271EE1}" type="datetimeFigureOut">
               <a:rPr lang="es-ES" smtClean="0"/>
-              <a:t>27/12/2023</a:t>
+              <a:t>08/01/2024</a:t>
             </a:fld>
             <a:endParaRPr lang="es-ES"/>
           </a:p>
@@ -4695,7 +4695,7 @@
           <a:p>
             <a:fld id="{CD7214D7-428D-4601-A337-8B3EF9271EE1}" type="datetimeFigureOut">
               <a:rPr lang="es-ES" smtClean="0"/>
-              <a:t>27/12/2023</a:t>
+              <a:t>08/01/2024</a:t>
             </a:fld>
             <a:endParaRPr lang="es-ES"/>
           </a:p>
@@ -4978,7 +4978,7 @@
           <a:p>
             <a:fld id="{CD7214D7-428D-4601-A337-8B3EF9271EE1}" type="datetimeFigureOut">
               <a:rPr lang="es-ES" smtClean="0"/>
-              <a:t>27/12/2023</a:t>
+              <a:t>08/01/2024</a:t>
             </a:fld>
             <a:endParaRPr lang="es-ES"/>
           </a:p>
@@ -5269,7 +5269,7 @@
           <a:p>
             <a:fld id="{CD7214D7-428D-4601-A337-8B3EF9271EE1}" type="datetimeFigureOut">
               <a:rPr lang="es-ES" smtClean="0"/>
-              <a:t>27/12/2023</a:t>
+              <a:t>08/01/2024</a:t>
             </a:fld>
             <a:endParaRPr lang="es-ES"/>
           </a:p>
@@ -5500,7 +5500,7 @@
           <a:p>
             <a:fld id="{CD7214D7-428D-4601-A337-8B3EF9271EE1}" type="datetimeFigureOut">
               <a:rPr lang="es-ES" smtClean="0"/>
-              <a:t>27/12/2023</a:t>
+              <a:t>08/01/2024</a:t>
             </a:fld>
             <a:endParaRPr lang="es-ES"/>
           </a:p>
@@ -6722,7 +6722,7 @@
         <p:spPr>
           <a:xfrm>
             <a:off x="1502229" y="811310"/>
-            <a:ext cx="4593771" cy="2769989"/>
+            <a:ext cx="4593771" cy="5355312"/>
           </a:xfrm>
           <a:prstGeom prst="rect">
             <a:avLst/>
@@ -6797,6 +6797,252 @@
           </a:p>
           <a:p>
             <a:pPr lvl="1"/>
+            <a:r>
+              <a:rPr lang="es-ES" sz="1200" dirty="0">
+                <a:solidFill>
+                  <a:schemeClr val="accent4">
+                    <a:lumMod val="60000"/>
+                    <a:lumOff val="40000"/>
+                  </a:schemeClr>
+                </a:solidFill>
+                <a:latin typeface="Titillium Web" panose="00000500000000000000" pitchFamily="2" charset="0"/>
+              </a:rPr>
+              <a:t>UNIDAD 2:  Spring con VSC</a:t>
+            </a:r>
+          </a:p>
+          <a:p>
+            <a:pPr lvl="1"/>
+            <a:r>
+              <a:rPr lang="es-ES" sz="1200" dirty="0">
+                <a:solidFill>
+                  <a:schemeClr val="accent4">
+                    <a:lumMod val="60000"/>
+                    <a:lumOff val="40000"/>
+                  </a:schemeClr>
+                </a:solidFill>
+                <a:latin typeface="Titillium Web" panose="00000500000000000000" pitchFamily="2" charset="0"/>
+              </a:rPr>
+              <a:t>UNIDAD 3:  Anotaciones en Spring</a:t>
+            </a:r>
+          </a:p>
+          <a:p>
+            <a:pPr lvl="1"/>
+            <a:r>
+              <a:rPr lang="es-ES" sz="1200" dirty="0">
+                <a:solidFill>
+                  <a:schemeClr val="accent4">
+                    <a:lumMod val="60000"/>
+                    <a:lumOff val="40000"/>
+                  </a:schemeClr>
+                </a:solidFill>
+                <a:latin typeface="Titillium Web" panose="00000500000000000000" pitchFamily="2" charset="0"/>
+              </a:rPr>
+              <a:t>UNIDAD 4:  Spring MVC </a:t>
+            </a:r>
+          </a:p>
+          <a:p>
+            <a:pPr lvl="1"/>
+            <a:r>
+              <a:rPr lang="es-ES" sz="1200" dirty="0">
+                <a:solidFill>
+                  <a:schemeClr val="accent4">
+                    <a:lumMod val="60000"/>
+                    <a:lumOff val="40000"/>
+                  </a:schemeClr>
+                </a:solidFill>
+                <a:latin typeface="Titillium Web" panose="00000500000000000000" pitchFamily="2" charset="0"/>
+              </a:rPr>
+              <a:t>UNIDAD 5: Spring MVC I</a:t>
+            </a:r>
+          </a:p>
+          <a:p>
+            <a:pPr lvl="1"/>
+            <a:r>
+              <a:rPr lang="es-ES" sz="1200" dirty="0">
+                <a:solidFill>
+                  <a:schemeClr val="accent4">
+                    <a:lumMod val="60000"/>
+                    <a:lumOff val="40000"/>
+                  </a:schemeClr>
+                </a:solidFill>
+                <a:latin typeface="Titillium Web" panose="00000500000000000000" pitchFamily="2" charset="0"/>
+              </a:rPr>
+              <a:t>UNIDAD 6: Spring MVC II</a:t>
+            </a:r>
+            <a:r>
+              <a:rPr lang="es-ES" sz="1200" dirty="0">
+                <a:solidFill>
+                  <a:schemeClr val="accent4">
+                    <a:lumMod val="60000"/>
+                    <a:lumOff val="40000"/>
+                  </a:schemeClr>
+                </a:solidFill>
+                <a:latin typeface="Titillium Web" panose="00000500000000000000" pitchFamily="2" charset="0"/>
+                <a:sym typeface="Wingdings" panose="05000000000000000000" pitchFamily="2" charset="2"/>
+              </a:rPr>
+              <a:t> Inyecciones de Dependencias</a:t>
+            </a:r>
+            <a:endParaRPr lang="es-ES" sz="1200" dirty="0">
+              <a:solidFill>
+                <a:schemeClr val="accent4">
+                  <a:lumMod val="60000"/>
+                  <a:lumOff val="40000"/>
+                </a:schemeClr>
+              </a:solidFill>
+              <a:latin typeface="Titillium Web" panose="00000500000000000000" pitchFamily="2" charset="0"/>
+            </a:endParaRPr>
+          </a:p>
+          <a:p>
+            <a:pPr lvl="1"/>
+            <a:r>
+              <a:rPr lang="es-ES" sz="1200" dirty="0">
+                <a:solidFill>
+                  <a:schemeClr val="accent4">
+                    <a:lumMod val="60000"/>
+                    <a:lumOff val="40000"/>
+                  </a:schemeClr>
+                </a:solidFill>
+                <a:latin typeface="Titillium Web" panose="00000500000000000000" pitchFamily="2" charset="0"/>
+              </a:rPr>
+              <a:t>UNIDAD 7:Spring MVC III</a:t>
+            </a:r>
+            <a:r>
+              <a:rPr lang="es-ES" sz="1200" dirty="0">
+                <a:solidFill>
+                  <a:schemeClr val="accent4">
+                    <a:lumMod val="60000"/>
+                    <a:lumOff val="40000"/>
+                  </a:schemeClr>
+                </a:solidFill>
+                <a:latin typeface="Titillium Web" panose="00000500000000000000" pitchFamily="2" charset="0"/>
+                <a:sym typeface="Wingdings" panose="05000000000000000000" pitchFamily="2" charset="2"/>
+              </a:rPr>
+              <a:t> </a:t>
+            </a:r>
+            <a:r>
+              <a:rPr lang="es-ES" sz="1200" dirty="0" err="1">
+                <a:solidFill>
+                  <a:schemeClr val="accent4">
+                    <a:lumMod val="60000"/>
+                    <a:lumOff val="40000"/>
+                  </a:schemeClr>
+                </a:solidFill>
+                <a:latin typeface="Titillium Web" panose="00000500000000000000" pitchFamily="2" charset="0"/>
+                <a:sym typeface="Wingdings" panose="05000000000000000000" pitchFamily="2" charset="2"/>
+              </a:rPr>
+              <a:t>Thymeleaf</a:t>
+            </a:r>
+            <a:endParaRPr lang="es-ES" sz="1200" dirty="0">
+              <a:solidFill>
+                <a:schemeClr val="accent4">
+                  <a:lumMod val="60000"/>
+                  <a:lumOff val="40000"/>
+                </a:schemeClr>
+              </a:solidFill>
+              <a:latin typeface="Titillium Web" panose="00000500000000000000" pitchFamily="2" charset="0"/>
+            </a:endParaRPr>
+          </a:p>
+          <a:p>
+            <a:pPr lvl="1"/>
+            <a:r>
+              <a:rPr lang="es-ES" sz="1200" dirty="0">
+                <a:solidFill>
+                  <a:schemeClr val="accent4">
+                    <a:lumMod val="60000"/>
+                    <a:lumOff val="40000"/>
+                  </a:schemeClr>
+                </a:solidFill>
+                <a:latin typeface="Titillium Web" panose="00000500000000000000" pitchFamily="2" charset="0"/>
+              </a:rPr>
+              <a:t>UNIDAD 8:Spring MVC IV</a:t>
+            </a:r>
+            <a:r>
+              <a:rPr lang="es-ES" sz="1200" dirty="0">
+                <a:solidFill>
+                  <a:schemeClr val="accent4">
+                    <a:lumMod val="60000"/>
+                    <a:lumOff val="40000"/>
+                  </a:schemeClr>
+                </a:solidFill>
+                <a:latin typeface="Titillium Web" panose="00000500000000000000" pitchFamily="2" charset="0"/>
+                <a:sym typeface="Wingdings" panose="05000000000000000000" pitchFamily="2" charset="2"/>
+              </a:rPr>
+              <a:t>  Inyección de Dependencias</a:t>
+            </a:r>
+            <a:endParaRPr lang="es-ES" sz="1200" dirty="0">
+              <a:solidFill>
+                <a:schemeClr val="accent4">
+                  <a:lumMod val="60000"/>
+                  <a:lumOff val="40000"/>
+                </a:schemeClr>
+              </a:solidFill>
+              <a:latin typeface="Titillium Web" panose="00000500000000000000" pitchFamily="2" charset="0"/>
+            </a:endParaRPr>
+          </a:p>
+          <a:p>
+            <a:pPr lvl="1"/>
+            <a:r>
+              <a:rPr lang="es-ES" sz="1200" dirty="0">
+                <a:solidFill>
+                  <a:schemeClr val="accent4">
+                    <a:lumMod val="60000"/>
+                    <a:lumOff val="40000"/>
+                  </a:schemeClr>
+                </a:solidFill>
+                <a:latin typeface="Titillium Web" panose="00000500000000000000" pitchFamily="2" charset="0"/>
+              </a:rPr>
+              <a:t>UNIDAD 10:Spring MVC V</a:t>
+            </a:r>
+            <a:r>
+              <a:rPr lang="es-ES" sz="1200" dirty="0">
+                <a:solidFill>
+                  <a:schemeClr val="accent4">
+                    <a:lumMod val="60000"/>
+                    <a:lumOff val="40000"/>
+                  </a:schemeClr>
+                </a:solidFill>
+                <a:latin typeface="Titillium Web" panose="00000500000000000000" pitchFamily="2" charset="0"/>
+                <a:sym typeface="Wingdings" panose="05000000000000000000" pitchFamily="2" charset="2"/>
+              </a:rPr>
+              <a:t> Excepciones</a:t>
+            </a:r>
+            <a:endParaRPr lang="es-ES" sz="1200" dirty="0">
+              <a:solidFill>
+                <a:schemeClr val="accent4">
+                  <a:lumMod val="60000"/>
+                  <a:lumOff val="40000"/>
+                </a:schemeClr>
+              </a:solidFill>
+              <a:latin typeface="Titillium Web" panose="00000500000000000000" pitchFamily="2" charset="0"/>
+            </a:endParaRPr>
+          </a:p>
+          <a:p>
+            <a:pPr lvl="1"/>
+            <a:r>
+              <a:rPr lang="es-ES" sz="1200" dirty="0">
+                <a:solidFill>
+                  <a:schemeClr val="accent4">
+                    <a:lumMod val="60000"/>
+                    <a:lumOff val="40000"/>
+                  </a:schemeClr>
+                </a:solidFill>
+                <a:latin typeface="Titillium Web" panose="00000500000000000000" pitchFamily="2" charset="0"/>
+              </a:rPr>
+              <a:t>UNIDAD 11:Sprinv MVC VI </a:t>
+            </a:r>
+            <a:r>
+              <a:rPr lang="es-ES" sz="1200" dirty="0">
+                <a:solidFill>
+                  <a:schemeClr val="accent4">
+                    <a:lumMod val="60000"/>
+                    <a:lumOff val="40000"/>
+                  </a:schemeClr>
+                </a:solidFill>
+                <a:latin typeface="Titillium Web" panose="00000500000000000000" pitchFamily="2" charset="0"/>
+                <a:sym typeface="Wingdings" panose="05000000000000000000" pitchFamily="2" charset="2"/>
+              </a:rPr>
+              <a:t> Security</a:t>
+            </a:r>
             <a:endParaRPr lang="es-ES" sz="1200" dirty="0">
               <a:solidFill>
                 <a:schemeClr val="accent4">
@@ -6847,7 +7093,7 @@
                 <a:effectLst/>
                 <a:latin typeface="Titillium Web" panose="00000500000000000000" pitchFamily="2" charset="0"/>
               </a:rPr>
-              <a:t>UNIDAD 1: </a:t>
+              <a:t>UNIDAD 12: </a:t>
             </a:r>
             <a:r>
               <a:rPr lang="es-ES" sz="1200" dirty="0">
@@ -6859,7 +7105,181 @@
                 </a:solidFill>
                 <a:latin typeface="Titillium Web" panose="00000500000000000000" pitchFamily="2" charset="0"/>
               </a:rPr>
-              <a:t> Introducción a Spring</a:t>
+              <a:t> Spring </a:t>
+            </a:r>
+            <a:r>
+              <a:rPr lang="es-ES" sz="1200" dirty="0" err="1">
+                <a:solidFill>
+                  <a:schemeClr val="accent4">
+                    <a:lumMod val="60000"/>
+                    <a:lumOff val="40000"/>
+                  </a:schemeClr>
+                </a:solidFill>
+                <a:latin typeface="Titillium Web" panose="00000500000000000000" pitchFamily="2" charset="0"/>
+              </a:rPr>
+              <a:t>Rest</a:t>
+            </a:r>
+            <a:endParaRPr lang="es-ES" sz="1200" dirty="0">
+              <a:solidFill>
+                <a:schemeClr val="accent4">
+                  <a:lumMod val="60000"/>
+                  <a:lumOff val="40000"/>
+                </a:schemeClr>
+              </a:solidFill>
+              <a:latin typeface="Titillium Web" panose="00000500000000000000" pitchFamily="2" charset="0"/>
+            </a:endParaRPr>
+          </a:p>
+          <a:p>
+            <a:pPr lvl="1"/>
+            <a:r>
+              <a:rPr lang="es-ES" sz="1200" dirty="0">
+                <a:solidFill>
+                  <a:schemeClr val="accent4">
+                    <a:lumMod val="60000"/>
+                    <a:lumOff val="40000"/>
+                  </a:schemeClr>
+                </a:solidFill>
+                <a:latin typeface="Titillium Web" panose="00000500000000000000" pitchFamily="2" charset="0"/>
+              </a:rPr>
+              <a:t>UNIDAD 13: Spring </a:t>
+            </a:r>
+            <a:r>
+              <a:rPr lang="es-ES" sz="1200" dirty="0" err="1">
+                <a:solidFill>
+                  <a:schemeClr val="accent4">
+                    <a:lumMod val="60000"/>
+                    <a:lumOff val="40000"/>
+                  </a:schemeClr>
+                </a:solidFill>
+                <a:latin typeface="Titillium Web" panose="00000500000000000000" pitchFamily="2" charset="0"/>
+              </a:rPr>
+              <a:t>Rest</a:t>
+            </a:r>
+            <a:r>
+              <a:rPr lang="es-ES" sz="1200" dirty="0">
+                <a:solidFill>
+                  <a:schemeClr val="accent4">
+                    <a:lumMod val="60000"/>
+                    <a:lumOff val="40000"/>
+                  </a:schemeClr>
+                </a:solidFill>
+                <a:latin typeface="Titillium Web" panose="00000500000000000000" pitchFamily="2" charset="0"/>
+              </a:rPr>
+              <a:t> con ORM</a:t>
+            </a:r>
+          </a:p>
+          <a:p>
+            <a:pPr lvl="1"/>
+            <a:endParaRPr lang="es-ES" sz="1200" dirty="0">
+              <a:solidFill>
+                <a:schemeClr val="accent4">
+                  <a:lumMod val="60000"/>
+                  <a:lumOff val="40000"/>
+                </a:schemeClr>
+              </a:solidFill>
+              <a:latin typeface="Titillium Web" panose="00000500000000000000" pitchFamily="2" charset="0"/>
+            </a:endParaRPr>
+          </a:p>
+          <a:p>
+            <a:pPr lvl="1"/>
+            <a:r>
+              <a:rPr lang="es-ES" sz="1200" dirty="0">
+                <a:solidFill>
+                  <a:schemeClr val="accent4">
+                    <a:lumMod val="60000"/>
+                    <a:lumOff val="40000"/>
+                  </a:schemeClr>
+                </a:solidFill>
+                <a:latin typeface="Titillium Web" panose="00000500000000000000" pitchFamily="2" charset="0"/>
+              </a:rPr>
+              <a:t>ANEXOS</a:t>
+            </a:r>
+          </a:p>
+          <a:p>
+            <a:pPr lvl="1"/>
+            <a:r>
+              <a:rPr lang="es-ES" sz="1200" dirty="0">
+                <a:solidFill>
+                  <a:schemeClr val="accent4">
+                    <a:lumMod val="60000"/>
+                    <a:lumOff val="40000"/>
+                  </a:schemeClr>
+                </a:solidFill>
+                <a:latin typeface="Titillium Web" panose="00000500000000000000" pitchFamily="2" charset="0"/>
+              </a:rPr>
+              <a:t>Unidad A: Spring MVC </a:t>
+            </a:r>
+            <a:r>
+              <a:rPr lang="es-ES" sz="1200" dirty="0" err="1">
+                <a:solidFill>
+                  <a:schemeClr val="accent4">
+                    <a:lumMod val="60000"/>
+                    <a:lumOff val="40000"/>
+                  </a:schemeClr>
+                </a:solidFill>
+                <a:latin typeface="Titillium Web" panose="00000500000000000000" pitchFamily="2" charset="0"/>
+              </a:rPr>
+              <a:t>MySql</a:t>
+            </a:r>
+            <a:endParaRPr lang="es-ES" sz="1200" dirty="0">
+              <a:solidFill>
+                <a:schemeClr val="accent4">
+                  <a:lumMod val="60000"/>
+                  <a:lumOff val="40000"/>
+                </a:schemeClr>
+              </a:solidFill>
+              <a:latin typeface="Titillium Web" panose="00000500000000000000" pitchFamily="2" charset="0"/>
+            </a:endParaRPr>
+          </a:p>
+          <a:p>
+            <a:pPr lvl="1"/>
+            <a:r>
+              <a:rPr lang="es-ES" sz="1200" dirty="0">
+                <a:solidFill>
+                  <a:schemeClr val="accent4">
+                    <a:lumMod val="60000"/>
+                    <a:lumOff val="40000"/>
+                  </a:schemeClr>
+                </a:solidFill>
+                <a:latin typeface="Titillium Web" panose="00000500000000000000" pitchFamily="2" charset="0"/>
+              </a:rPr>
+              <a:t>Unidad B: Spring </a:t>
+            </a:r>
+            <a:r>
+              <a:rPr lang="es-ES" sz="1200" dirty="0" err="1">
+                <a:solidFill>
+                  <a:schemeClr val="accent4">
+                    <a:lumMod val="60000"/>
+                    <a:lumOff val="40000"/>
+                  </a:schemeClr>
+                </a:solidFill>
+                <a:latin typeface="Titillium Web" panose="00000500000000000000" pitchFamily="2" charset="0"/>
+              </a:rPr>
+              <a:t>Rest</a:t>
+            </a:r>
+            <a:r>
+              <a:rPr lang="es-ES" sz="1200" dirty="0">
+                <a:solidFill>
+                  <a:schemeClr val="accent4">
+                    <a:lumMod val="60000"/>
+                    <a:lumOff val="40000"/>
+                  </a:schemeClr>
+                </a:solidFill>
+                <a:latin typeface="Titillium Web" panose="00000500000000000000" pitchFamily="2" charset="0"/>
+              </a:rPr>
+              <a:t> </a:t>
+            </a:r>
+            <a:r>
+              <a:rPr lang="es-ES" sz="1200" dirty="0" err="1">
+                <a:solidFill>
+                  <a:schemeClr val="accent4">
+                    <a:lumMod val="60000"/>
+                    <a:lumOff val="40000"/>
+                  </a:schemeClr>
+                </a:solidFill>
+                <a:latin typeface="Titillium Web" panose="00000500000000000000" pitchFamily="2" charset="0"/>
+              </a:rPr>
+              <a:t>Postman</a:t>
             </a:r>
             <a:br>
               <a:rPr lang="es-ES" sz="1200" dirty="0">

</xml_diff>

<commit_message>
Añadimos lo nuevo de Rest JPA
</commit_message>
<xml_diff>
--- a/Presentacion curso Spring.pptx
+++ b/Presentacion curso Spring.pptx
@@ -199,7 +199,7 @@
           <a:p>
             <a:fld id="{C5E4E8B3-BC3D-4B17-AD72-6EEF0757A344}" type="datetimeFigureOut">
               <a:rPr lang="es-ES" smtClean="0"/>
-              <a:t>09/01/2024</a:t>
+              <a:t>12/01/2024</a:t>
             </a:fld>
             <a:endParaRPr lang="es-ES"/>
           </a:p>
@@ -871,7 +871,7 @@
           <a:p>
             <a:fld id="{CD7214D7-428D-4601-A337-8B3EF9271EE1}" type="datetimeFigureOut">
               <a:rPr lang="es-ES" smtClean="0"/>
-              <a:t>09/01/2024</a:t>
+              <a:t>12/01/2024</a:t>
             </a:fld>
             <a:endParaRPr lang="es-ES"/>
           </a:p>
@@ -1162,7 +1162,7 @@
           <a:p>
             <a:fld id="{CD7214D7-428D-4601-A337-8B3EF9271EE1}" type="datetimeFigureOut">
               <a:rPr lang="es-ES" smtClean="0"/>
-              <a:t>09/01/2024</a:t>
+              <a:t>12/01/2024</a:t>
             </a:fld>
             <a:endParaRPr lang="es-ES"/>
           </a:p>
@@ -1421,7 +1421,7 @@
           <a:p>
             <a:fld id="{CD7214D7-428D-4601-A337-8B3EF9271EE1}" type="datetimeFigureOut">
               <a:rPr lang="es-ES" smtClean="0"/>
-              <a:t>09/01/2024</a:t>
+              <a:t>12/01/2024</a:t>
             </a:fld>
             <a:endParaRPr lang="es-ES"/>
           </a:p>
@@ -1890,7 +1890,7 @@
           <a:p>
             <a:fld id="{CD7214D7-428D-4601-A337-8B3EF9271EE1}" type="datetimeFigureOut">
               <a:rPr lang="es-ES" smtClean="0"/>
-              <a:t>09/01/2024</a:t>
+              <a:t>12/01/2024</a:t>
             </a:fld>
             <a:endParaRPr lang="es-ES"/>
           </a:p>
@@ -2070,7 +2070,7 @@
           <a:p>
             <a:fld id="{CD7214D7-428D-4601-A337-8B3EF9271EE1}" type="datetimeFigureOut">
               <a:rPr lang="es-ES" smtClean="0"/>
-              <a:t>09/01/2024</a:t>
+              <a:t>12/01/2024</a:t>
             </a:fld>
             <a:endParaRPr lang="es-ES"/>
           </a:p>
@@ -2646,7 +2646,7 @@
           <a:p>
             <a:fld id="{CD7214D7-428D-4601-A337-8B3EF9271EE1}" type="datetimeFigureOut">
               <a:rPr lang="es-ES" smtClean="0"/>
-              <a:t>09/01/2024</a:t>
+              <a:t>12/01/2024</a:t>
             </a:fld>
             <a:endParaRPr lang="es-ES"/>
           </a:p>
@@ -2978,7 +2978,7 @@
           <a:p>
             <a:fld id="{CD7214D7-428D-4601-A337-8B3EF9271EE1}" type="datetimeFigureOut">
               <a:rPr lang="es-ES" smtClean="0"/>
-              <a:t>09/01/2024</a:t>
+              <a:t>12/01/2024</a:t>
             </a:fld>
             <a:endParaRPr lang="es-ES"/>
           </a:p>
@@ -3153,7 +3153,7 @@
           <a:p>
             <a:fld id="{CD7214D7-428D-4601-A337-8B3EF9271EE1}" type="datetimeFigureOut">
               <a:rPr lang="es-ES" smtClean="0"/>
-              <a:t>09/01/2024</a:t>
+              <a:t>12/01/2024</a:t>
             </a:fld>
             <a:endParaRPr lang="es-ES"/>
           </a:p>
@@ -3333,7 +3333,7 @@
           <a:p>
             <a:fld id="{CD7214D7-428D-4601-A337-8B3EF9271EE1}" type="datetimeFigureOut">
               <a:rPr lang="es-ES" smtClean="0"/>
-              <a:t>09/01/2024</a:t>
+              <a:t>12/01/2024</a:t>
             </a:fld>
             <a:endParaRPr lang="es-ES"/>
           </a:p>
@@ -3503,7 +3503,7 @@
           <a:p>
             <a:fld id="{CD7214D7-428D-4601-A337-8B3EF9271EE1}" type="datetimeFigureOut">
               <a:rPr lang="es-ES" smtClean="0"/>
-              <a:t>09/01/2024</a:t>
+              <a:t>12/01/2024</a:t>
             </a:fld>
             <a:endParaRPr lang="es-ES"/>
           </a:p>
@@ -3760,7 +3760,7 @@
           <a:p>
             <a:fld id="{CD7214D7-428D-4601-A337-8B3EF9271EE1}" type="datetimeFigureOut">
               <a:rPr lang="es-ES" smtClean="0"/>
-              <a:t>09/01/2024</a:t>
+              <a:t>12/01/2024</a:t>
             </a:fld>
             <a:endParaRPr lang="es-ES"/>
           </a:p>
@@ -4052,7 +4052,7 @@
           <a:p>
             <a:fld id="{CD7214D7-428D-4601-A337-8B3EF9271EE1}" type="datetimeFigureOut">
               <a:rPr lang="es-ES" smtClean="0"/>
-              <a:t>09/01/2024</a:t>
+              <a:t>12/01/2024</a:t>
             </a:fld>
             <a:endParaRPr lang="es-ES"/>
           </a:p>
@@ -4482,7 +4482,7 @@
           <a:p>
             <a:fld id="{CD7214D7-428D-4601-A337-8B3EF9271EE1}" type="datetimeFigureOut">
               <a:rPr lang="es-ES" smtClean="0"/>
-              <a:t>09/01/2024</a:t>
+              <a:t>12/01/2024</a:t>
             </a:fld>
             <a:endParaRPr lang="es-ES"/>
           </a:p>
@@ -4600,7 +4600,7 @@
           <a:p>
             <a:fld id="{CD7214D7-428D-4601-A337-8B3EF9271EE1}" type="datetimeFigureOut">
               <a:rPr lang="es-ES" smtClean="0"/>
-              <a:t>09/01/2024</a:t>
+              <a:t>12/01/2024</a:t>
             </a:fld>
             <a:endParaRPr lang="es-ES"/>
           </a:p>
@@ -4695,7 +4695,7 @@
           <a:p>
             <a:fld id="{CD7214D7-428D-4601-A337-8B3EF9271EE1}" type="datetimeFigureOut">
               <a:rPr lang="es-ES" smtClean="0"/>
-              <a:t>09/01/2024</a:t>
+              <a:t>12/01/2024</a:t>
             </a:fld>
             <a:endParaRPr lang="es-ES"/>
           </a:p>
@@ -4978,7 +4978,7 @@
           <a:p>
             <a:fld id="{CD7214D7-428D-4601-A337-8B3EF9271EE1}" type="datetimeFigureOut">
               <a:rPr lang="es-ES" smtClean="0"/>
-              <a:t>09/01/2024</a:t>
+              <a:t>12/01/2024</a:t>
             </a:fld>
             <a:endParaRPr lang="es-ES"/>
           </a:p>
@@ -5269,7 +5269,7 @@
           <a:p>
             <a:fld id="{CD7214D7-428D-4601-A337-8B3EF9271EE1}" type="datetimeFigureOut">
               <a:rPr lang="es-ES" smtClean="0"/>
-              <a:t>09/01/2024</a:t>
+              <a:t>12/01/2024</a:t>
             </a:fld>
             <a:endParaRPr lang="es-ES"/>
           </a:p>
@@ -5500,7 +5500,7 @@
           <a:p>
             <a:fld id="{CD7214D7-428D-4601-A337-8B3EF9271EE1}" type="datetimeFigureOut">
               <a:rPr lang="es-ES" smtClean="0"/>
-              <a:t>09/01/2024</a:t>
+              <a:t>12/01/2024</a:t>
             </a:fld>
             <a:endParaRPr lang="es-ES"/>
           </a:p>
@@ -7517,7 +7517,7 @@
         <p:spPr>
           <a:xfrm>
             <a:off x="1366595" y="1252198"/>
-            <a:ext cx="4463565" cy="3877985"/>
+            <a:ext cx="4463565" cy="4985980"/>
           </a:xfrm>
           <a:prstGeom prst="rect">
             <a:avLst/>
@@ -7713,6 +7713,115 @@
               </a:solidFill>
               <a:latin typeface="Titillium Web" panose="00000500000000000000" pitchFamily="2" charset="0"/>
             </a:endParaRPr>
+          </a:p>
+          <a:p>
+            <a:pPr lvl="1"/>
+            <a:endParaRPr lang="es-ES" sz="1200" dirty="0">
+              <a:solidFill>
+                <a:schemeClr val="accent4">
+                  <a:lumMod val="60000"/>
+                  <a:lumOff val="40000"/>
+                </a:schemeClr>
+              </a:solidFill>
+              <a:latin typeface="Titillium Web" panose="00000500000000000000" pitchFamily="2" charset="0"/>
+            </a:endParaRPr>
+          </a:p>
+          <a:p>
+            <a:pPr lvl="1"/>
+            <a:r>
+              <a:rPr lang="es-ES" sz="1200" dirty="0">
+                <a:solidFill>
+                  <a:schemeClr val="tx1">
+                    <a:lumMod val="85000"/>
+                  </a:schemeClr>
+                </a:solidFill>
+                <a:latin typeface="Titillium Web" panose="00000500000000000000" pitchFamily="2" charset="0"/>
+              </a:rPr>
+              <a:t>Se deberán entregar dos aplicaciones:</a:t>
+            </a:r>
+          </a:p>
+          <a:p>
+            <a:pPr lvl="1"/>
+            <a:endParaRPr lang="es-ES" sz="1200" dirty="0">
+              <a:solidFill>
+                <a:schemeClr val="tx1">
+                  <a:lumMod val="85000"/>
+                </a:schemeClr>
+              </a:solidFill>
+              <a:latin typeface="Titillium Web" panose="00000500000000000000" pitchFamily="2" charset="0"/>
+            </a:endParaRPr>
+          </a:p>
+          <a:p>
+            <a:pPr lvl="1"/>
+            <a:r>
+              <a:rPr lang="es-ES" sz="1200" dirty="0">
+                <a:solidFill>
+                  <a:schemeClr val="tx1">
+                    <a:lumMod val="85000"/>
+                  </a:schemeClr>
+                </a:solidFill>
+                <a:latin typeface="Titillium Web" panose="00000500000000000000" pitchFamily="2" charset="0"/>
+              </a:rPr>
+              <a:t>1- Aplicación MVC con </a:t>
+            </a:r>
+            <a:r>
+              <a:rPr lang="es-ES" sz="1200" dirty="0" err="1">
+                <a:solidFill>
+                  <a:schemeClr val="tx1">
+                    <a:lumMod val="85000"/>
+                  </a:schemeClr>
+                </a:solidFill>
+                <a:latin typeface="Titillium Web" panose="00000500000000000000" pitchFamily="2" charset="0"/>
+              </a:rPr>
+              <a:t>Thymeleaf</a:t>
+            </a:r>
+            <a:r>
+              <a:rPr lang="es-ES" sz="1200" dirty="0">
+                <a:solidFill>
+                  <a:schemeClr val="tx1">
+                    <a:lumMod val="85000"/>
+                  </a:schemeClr>
+                </a:solidFill>
+                <a:latin typeface="Titillium Web" panose="00000500000000000000" pitchFamily="2" charset="0"/>
+              </a:rPr>
+              <a:t>: CRM de una consulta médica. </a:t>
+            </a:r>
+          </a:p>
+          <a:p>
+            <a:pPr lvl="1"/>
+            <a:r>
+              <a:rPr lang="es-ES" sz="1200" dirty="0">
+                <a:solidFill>
+                  <a:schemeClr val="tx1">
+                    <a:lumMod val="85000"/>
+                  </a:schemeClr>
+                </a:solidFill>
+                <a:latin typeface="Titillium Web" panose="00000500000000000000" pitchFamily="2" charset="0"/>
+              </a:rPr>
+              <a:t>2- Aplicación </a:t>
+            </a:r>
+            <a:r>
+              <a:rPr lang="es-ES" sz="1200" dirty="0" err="1">
+                <a:solidFill>
+                  <a:schemeClr val="tx1">
+                    <a:lumMod val="85000"/>
+                  </a:schemeClr>
+                </a:solidFill>
+                <a:latin typeface="Titillium Web" panose="00000500000000000000" pitchFamily="2" charset="0"/>
+              </a:rPr>
+              <a:t>Rest</a:t>
+            </a:r>
+            <a:r>
+              <a:rPr lang="es-ES" sz="1200" dirty="0">
+                <a:solidFill>
+                  <a:schemeClr val="tx1">
+                    <a:lumMod val="85000"/>
+                  </a:schemeClr>
+                </a:solidFill>
+                <a:latin typeface="Titillium Web" panose="00000500000000000000" pitchFamily="2" charset="0"/>
+              </a:rPr>
+              <a:t> : CRM de una consulta medica</a:t>
+            </a:r>
           </a:p>
           <a:p>
             <a:pPr marL="628650" lvl="1" indent="-171450">

</xml_diff>